<commit_message>
det funnction half done
</commit_message>
<xml_diff>
--- a/图标制作.pptx
+++ b/图标制作.pptx
@@ -4660,12 +4660,15 @@
         <p:spPr>
           <a:xfrm>
             <a:off x="2112048" y="1003847"/>
-            <a:ext cx="7668000" cy="2412000"/>
+            <a:ext cx="7668000" cy="2554545"/>
           </a:xfrm>
           <a:prstGeom prst="rect">
             <a:avLst/>
           </a:prstGeom>
           <a:noFill/>
+          <a:ln>
+            <a:noFill/>
+          </a:ln>
         </p:spPr>
         <p:txBody>
           <a:bodyPr wrap="square" lIns="91440" tIns="45720" rIns="91440" bIns="45720">
@@ -4676,10 +4679,11 @@
             <a:pPr algn="ctr"/>
             <a:r>
               <a:rPr lang="zh-CN" altLang="en-US" sz="8000" b="1" i="1" cap="none" spc="0" dirty="0">
-                <a:ln w="12700">
+                <a:ln w="6350">
                   <a:solidFill>
-                    <a:schemeClr val="bg1">
-                      <a:lumMod val="50000"/>
+                    <a:schemeClr val="tx1">
+                      <a:lumMod val="75000"/>
+                      <a:lumOff val="25000"/>
                     </a:schemeClr>
                   </a:solidFill>
                   <a:prstDash val="solid"/>
@@ -4704,10 +4708,11 @@
             </a:r>
             <a:r>
               <a:rPr lang="zh-CN" altLang="en-US" sz="8000" b="1" i="1" cap="none" spc="0" dirty="0">
-                <a:ln w="12700">
+                <a:ln w="6350">
                   <a:solidFill>
-                    <a:schemeClr val="bg1">
-                      <a:lumMod val="50000"/>
+                    <a:schemeClr val="tx1">
+                      <a:lumMod val="75000"/>
+                      <a:lumOff val="25000"/>
                     </a:schemeClr>
                   </a:solidFill>
                   <a:prstDash val="solid"/>
@@ -4732,10 +4737,11 @@
             </a:r>
             <a:r>
               <a:rPr lang="zh-CN" altLang="en-US" sz="8000" b="1" i="1" cap="none" spc="0" dirty="0">
-                <a:ln w="12700">
+                <a:ln w="6350">
                   <a:solidFill>
-                    <a:schemeClr val="bg1">
-                      <a:lumMod val="50000"/>
+                    <a:schemeClr val="tx1">
+                      <a:lumMod val="75000"/>
+                      <a:lumOff val="25000"/>
                     </a:schemeClr>
                   </a:solidFill>
                   <a:prstDash val="solid"/>
@@ -4760,10 +4766,11 @@
               <a:t>标注</a:t>
             </a:r>
             <a:endParaRPr lang="en-US" altLang="zh-CN" sz="8000" b="1" i="1" cap="none" spc="0" dirty="0">
-              <a:ln w="12700">
+              <a:ln w="6350">
                 <a:solidFill>
-                  <a:schemeClr val="bg1">
-                    <a:lumMod val="50000"/>
+                  <a:schemeClr val="tx1">
+                    <a:lumMod val="75000"/>
+                    <a:lumOff val="25000"/>
                   </a:schemeClr>
                 </a:solidFill>
                 <a:prstDash val="solid"/>
@@ -4790,10 +4797,11 @@
             <a:pPr algn="ctr"/>
             <a:r>
               <a:rPr lang="en-US" altLang="zh-CN" sz="8000" b="1" i="1" cap="none" spc="0" dirty="0" err="1">
-                <a:ln w="12700">
+                <a:ln w="6350">
                   <a:solidFill>
-                    <a:schemeClr val="bg1">
-                      <a:lumMod val="50000"/>
+                    <a:schemeClr val="tx1">
+                      <a:lumMod val="75000"/>
+                      <a:lumOff val="25000"/>
                     </a:schemeClr>
                   </a:solidFill>
                   <a:prstDash val="solid"/>
@@ -4819,10 +4827,11 @@
             </a:r>
             <a:r>
               <a:rPr lang="en-US" altLang="zh-CN" sz="8000" i="1" cap="none" spc="0" dirty="0" err="1">
-                <a:ln w="12700">
+                <a:ln w="6350">
                   <a:solidFill>
-                    <a:schemeClr val="bg1">
-                      <a:lumMod val="50000"/>
+                    <a:schemeClr val="tx1">
+                      <a:lumMod val="75000"/>
+                      <a:lumOff val="25000"/>
                     </a:schemeClr>
                   </a:solidFill>
                   <a:prstDash val="solid"/>
@@ -4848,10 +4857,11 @@
             </a:r>
             <a:r>
               <a:rPr lang="en-US" altLang="zh-CN" sz="8000" b="1" i="1" cap="none" spc="0" dirty="0" err="1">
-                <a:ln w="12700">
+                <a:ln w="6350">
                   <a:solidFill>
-                    <a:schemeClr val="bg1">
-                      <a:lumMod val="50000"/>
+                    <a:schemeClr val="tx1">
+                      <a:lumMod val="75000"/>
+                      <a:lumOff val="25000"/>
                     </a:schemeClr>
                   </a:solidFill>
                   <a:prstDash val="solid"/>
@@ -4876,10 +4886,11 @@
             </a:r>
             <a:r>
               <a:rPr lang="en-US" altLang="zh-CN" sz="8000" b="1" i="1" cap="none" spc="0" dirty="0" err="1">
-                <a:ln w="12700">
+                <a:ln w="6350">
                   <a:solidFill>
-                    <a:schemeClr val="bg1">
-                      <a:lumMod val="50000"/>
+                    <a:schemeClr val="tx1">
+                      <a:lumMod val="75000"/>
+                      <a:lumOff val="25000"/>
                     </a:schemeClr>
                   </a:solidFill>
                   <a:prstDash val="solid"/>
@@ -4904,10 +4915,11 @@
               <a:t>Label</a:t>
             </a:r>
             <a:endParaRPr lang="zh-CN" altLang="en-US" sz="8000" b="1" i="1" cap="none" spc="0" dirty="0">
-              <a:ln w="12700">
+              <a:ln w="6350">
                 <a:solidFill>
-                  <a:schemeClr val="bg1">
-                    <a:lumMod val="50000"/>
+                  <a:schemeClr val="tx1">
+                    <a:lumMod val="75000"/>
+                    <a:lumOff val="25000"/>
                   </a:schemeClr>
                 </a:solidFill>
                 <a:prstDash val="solid"/>

</xml_diff>

<commit_message>
train val things need to be done
</commit_message>
<xml_diff>
--- a/图标制作.pptx
+++ b/图标制作.pptx
@@ -261,7 +261,7 @@
           <a:p>
             <a:fld id="{8DE58D4B-F8F1-46B0-900A-78CAEA29A71C}" type="datetimeFigureOut">
               <a:rPr lang="zh-CN" altLang="en-US" smtClean="0"/>
-              <a:t>2022/11/24</a:t>
+              <a:t>2022/12/15</a:t>
             </a:fld>
             <a:endParaRPr lang="zh-CN" altLang="en-US"/>
           </a:p>
@@ -459,7 +459,7 @@
           <a:p>
             <a:fld id="{8DE58D4B-F8F1-46B0-900A-78CAEA29A71C}" type="datetimeFigureOut">
               <a:rPr lang="zh-CN" altLang="en-US" smtClean="0"/>
-              <a:t>2022/11/24</a:t>
+              <a:t>2022/12/15</a:t>
             </a:fld>
             <a:endParaRPr lang="zh-CN" altLang="en-US"/>
           </a:p>
@@ -667,7 +667,7 @@
           <a:p>
             <a:fld id="{8DE58D4B-F8F1-46B0-900A-78CAEA29A71C}" type="datetimeFigureOut">
               <a:rPr lang="zh-CN" altLang="en-US" smtClean="0"/>
-              <a:t>2022/11/24</a:t>
+              <a:t>2022/12/15</a:t>
             </a:fld>
             <a:endParaRPr lang="zh-CN" altLang="en-US"/>
           </a:p>
@@ -865,7 +865,7 @@
           <a:p>
             <a:fld id="{8DE58D4B-F8F1-46B0-900A-78CAEA29A71C}" type="datetimeFigureOut">
               <a:rPr lang="zh-CN" altLang="en-US" smtClean="0"/>
-              <a:t>2022/11/24</a:t>
+              <a:t>2022/12/15</a:t>
             </a:fld>
             <a:endParaRPr lang="zh-CN" altLang="en-US"/>
           </a:p>
@@ -1140,7 +1140,7 @@
           <a:p>
             <a:fld id="{8DE58D4B-F8F1-46B0-900A-78CAEA29A71C}" type="datetimeFigureOut">
               <a:rPr lang="zh-CN" altLang="en-US" smtClean="0"/>
-              <a:t>2022/11/24</a:t>
+              <a:t>2022/12/15</a:t>
             </a:fld>
             <a:endParaRPr lang="zh-CN" altLang="en-US"/>
           </a:p>
@@ -1405,7 +1405,7 @@
           <a:p>
             <a:fld id="{8DE58D4B-F8F1-46B0-900A-78CAEA29A71C}" type="datetimeFigureOut">
               <a:rPr lang="zh-CN" altLang="en-US" smtClean="0"/>
-              <a:t>2022/11/24</a:t>
+              <a:t>2022/12/15</a:t>
             </a:fld>
             <a:endParaRPr lang="zh-CN" altLang="en-US"/>
           </a:p>
@@ -1817,7 +1817,7 @@
           <a:p>
             <a:fld id="{8DE58D4B-F8F1-46B0-900A-78CAEA29A71C}" type="datetimeFigureOut">
               <a:rPr lang="zh-CN" altLang="en-US" smtClean="0"/>
-              <a:t>2022/11/24</a:t>
+              <a:t>2022/12/15</a:t>
             </a:fld>
             <a:endParaRPr lang="zh-CN" altLang="en-US"/>
           </a:p>
@@ -1958,7 +1958,7 @@
           <a:p>
             <a:fld id="{8DE58D4B-F8F1-46B0-900A-78CAEA29A71C}" type="datetimeFigureOut">
               <a:rPr lang="zh-CN" altLang="en-US" smtClean="0"/>
-              <a:t>2022/11/24</a:t>
+              <a:t>2022/12/15</a:t>
             </a:fld>
             <a:endParaRPr lang="zh-CN" altLang="en-US"/>
           </a:p>
@@ -2071,7 +2071,7 @@
           <a:p>
             <a:fld id="{8DE58D4B-F8F1-46B0-900A-78CAEA29A71C}" type="datetimeFigureOut">
               <a:rPr lang="zh-CN" altLang="en-US" smtClean="0"/>
-              <a:t>2022/11/24</a:t>
+              <a:t>2022/12/15</a:t>
             </a:fld>
             <a:endParaRPr lang="zh-CN" altLang="en-US"/>
           </a:p>
@@ -2382,7 +2382,7 @@
           <a:p>
             <a:fld id="{8DE58D4B-F8F1-46B0-900A-78CAEA29A71C}" type="datetimeFigureOut">
               <a:rPr lang="zh-CN" altLang="en-US" smtClean="0"/>
-              <a:t>2022/11/24</a:t>
+              <a:t>2022/12/15</a:t>
             </a:fld>
             <a:endParaRPr lang="zh-CN" altLang="en-US"/>
           </a:p>
@@ -2670,7 +2670,7 @@
           <a:p>
             <a:fld id="{8DE58D4B-F8F1-46B0-900A-78CAEA29A71C}" type="datetimeFigureOut">
               <a:rPr lang="zh-CN" altLang="en-US" smtClean="0"/>
-              <a:t>2022/11/24</a:t>
+              <a:t>2022/12/15</a:t>
             </a:fld>
             <a:endParaRPr lang="zh-CN" altLang="en-US"/>
           </a:p>
@@ -2911,7 +2911,7 @@
           <a:p>
             <a:fld id="{8DE58D4B-F8F1-46B0-900A-78CAEA29A71C}" type="datetimeFigureOut">
               <a:rPr lang="zh-CN" altLang="en-US" smtClean="0"/>
-              <a:t>2022/11/24</a:t>
+              <a:t>2022/12/15</a:t>
             </a:fld>
             <a:endParaRPr lang="zh-CN" altLang="en-US"/>
           </a:p>
@@ -4607,7 +4607,85 @@
         </p:blipFill>
         <p:spPr>
           <a:xfrm>
-            <a:off x="5108680" y="4358610"/>
+            <a:off x="2578899" y="2580602"/>
+            <a:ext cx="914400" cy="914400"/>
+          </a:xfrm>
+          <a:prstGeom prst="rect">
+            <a:avLst/>
+          </a:prstGeom>
+        </p:spPr>
+      </p:pic>
+      <p:pic>
+        <p:nvPicPr>
+          <p:cNvPr id="36" name="图形 35" descr="沙漏">
+            <a:extLst>
+              <a:ext uri="{FF2B5EF4-FFF2-40B4-BE49-F238E27FC236}">
+                <a16:creationId xmlns:a16="http://schemas.microsoft.com/office/drawing/2014/main" id="{2795EF9C-D652-3ED3-7A35-1E327E9AA46F}"/>
+              </a:ext>
+            </a:extLst>
+          </p:cNvPr>
+          <p:cNvPicPr>
+            <a:picLocks noChangeAspect="1"/>
+          </p:cNvPicPr>
+          <p:nvPr/>
+        </p:nvPicPr>
+        <p:blipFill>
+          <a:blip r:embed="rId68">
+            <a:extLst>
+              <a:ext uri="{28A0092B-C50C-407E-A947-70E740481C1C}">
+                <a14:useLocalDpi xmlns:a14="http://schemas.microsoft.com/office/drawing/2010/main" val="0"/>
+              </a:ext>
+              <a:ext uri="{96DAC541-7B7A-43D3-8B79-37D633B846F1}">
+                <asvg:svgBlip xmlns:asvg="http://schemas.microsoft.com/office/drawing/2016/SVG/main" r:embed="rId69"/>
+              </a:ext>
+            </a:extLst>
+          </a:blip>
+          <a:stretch>
+            <a:fillRect/>
+          </a:stretch>
+        </p:blipFill>
+        <p:spPr>
+          <a:xfrm>
+            <a:off x="4399614" y="4701465"/>
+            <a:ext cx="914400" cy="914400"/>
+          </a:xfrm>
+          <a:prstGeom prst="rect">
+            <a:avLst/>
+          </a:prstGeom>
+        </p:spPr>
+      </p:pic>
+      <p:pic>
+        <p:nvPicPr>
+          <p:cNvPr id="38" name="图形 37" descr="秒表">
+            <a:extLst>
+              <a:ext uri="{FF2B5EF4-FFF2-40B4-BE49-F238E27FC236}">
+                <a16:creationId xmlns:a16="http://schemas.microsoft.com/office/drawing/2014/main" id="{BFADC1A1-5B05-4544-55C7-9D45C77A3981}"/>
+              </a:ext>
+            </a:extLst>
+          </p:cNvPr>
+          <p:cNvPicPr>
+            <a:picLocks noChangeAspect="1"/>
+          </p:cNvPicPr>
+          <p:nvPr/>
+        </p:nvPicPr>
+        <p:blipFill>
+          <a:blip r:embed="rId70">
+            <a:extLst>
+              <a:ext uri="{28A0092B-C50C-407E-A947-70E740481C1C}">
+                <a14:useLocalDpi xmlns:a14="http://schemas.microsoft.com/office/drawing/2010/main" val="0"/>
+              </a:ext>
+              <a:ext uri="{96DAC541-7B7A-43D3-8B79-37D633B846F1}">
+                <asvg:svgBlip xmlns:asvg="http://schemas.microsoft.com/office/drawing/2016/SVG/main" r:embed="rId71"/>
+              </a:ext>
+            </a:extLst>
+          </a:blip>
+          <a:stretch>
+            <a:fillRect/>
+          </a:stretch>
+        </p:blipFill>
+        <p:spPr>
+          <a:xfrm>
+            <a:off x="6096000" y="4701465"/>
             <a:ext cx="914400" cy="914400"/>
           </a:xfrm>
           <a:prstGeom prst="rect">

</xml_diff>

<commit_message>
train val things done
</commit_message>
<xml_diff>
--- a/图标制作.pptx
+++ b/图标制作.pptx
@@ -261,7 +261,7 @@
           <a:p>
             <a:fld id="{8DE58D4B-F8F1-46B0-900A-78CAEA29A71C}" type="datetimeFigureOut">
               <a:rPr lang="zh-CN" altLang="en-US" smtClean="0"/>
-              <a:t>2022/12/15</a:t>
+              <a:t>2022/12/20</a:t>
             </a:fld>
             <a:endParaRPr lang="zh-CN" altLang="en-US"/>
           </a:p>
@@ -459,7 +459,7 @@
           <a:p>
             <a:fld id="{8DE58D4B-F8F1-46B0-900A-78CAEA29A71C}" type="datetimeFigureOut">
               <a:rPr lang="zh-CN" altLang="en-US" smtClean="0"/>
-              <a:t>2022/12/15</a:t>
+              <a:t>2022/12/20</a:t>
             </a:fld>
             <a:endParaRPr lang="zh-CN" altLang="en-US"/>
           </a:p>
@@ -667,7 +667,7 @@
           <a:p>
             <a:fld id="{8DE58D4B-F8F1-46B0-900A-78CAEA29A71C}" type="datetimeFigureOut">
               <a:rPr lang="zh-CN" altLang="en-US" smtClean="0"/>
-              <a:t>2022/12/15</a:t>
+              <a:t>2022/12/20</a:t>
             </a:fld>
             <a:endParaRPr lang="zh-CN" altLang="en-US"/>
           </a:p>
@@ -865,7 +865,7 @@
           <a:p>
             <a:fld id="{8DE58D4B-F8F1-46B0-900A-78CAEA29A71C}" type="datetimeFigureOut">
               <a:rPr lang="zh-CN" altLang="en-US" smtClean="0"/>
-              <a:t>2022/12/15</a:t>
+              <a:t>2022/12/20</a:t>
             </a:fld>
             <a:endParaRPr lang="zh-CN" altLang="en-US"/>
           </a:p>
@@ -1140,7 +1140,7 @@
           <a:p>
             <a:fld id="{8DE58D4B-F8F1-46B0-900A-78CAEA29A71C}" type="datetimeFigureOut">
               <a:rPr lang="zh-CN" altLang="en-US" smtClean="0"/>
-              <a:t>2022/12/15</a:t>
+              <a:t>2022/12/20</a:t>
             </a:fld>
             <a:endParaRPr lang="zh-CN" altLang="en-US"/>
           </a:p>
@@ -1405,7 +1405,7 @@
           <a:p>
             <a:fld id="{8DE58D4B-F8F1-46B0-900A-78CAEA29A71C}" type="datetimeFigureOut">
               <a:rPr lang="zh-CN" altLang="en-US" smtClean="0"/>
-              <a:t>2022/12/15</a:t>
+              <a:t>2022/12/20</a:t>
             </a:fld>
             <a:endParaRPr lang="zh-CN" altLang="en-US"/>
           </a:p>
@@ -1817,7 +1817,7 @@
           <a:p>
             <a:fld id="{8DE58D4B-F8F1-46B0-900A-78CAEA29A71C}" type="datetimeFigureOut">
               <a:rPr lang="zh-CN" altLang="en-US" smtClean="0"/>
-              <a:t>2022/12/15</a:t>
+              <a:t>2022/12/20</a:t>
             </a:fld>
             <a:endParaRPr lang="zh-CN" altLang="en-US"/>
           </a:p>
@@ -1958,7 +1958,7 @@
           <a:p>
             <a:fld id="{8DE58D4B-F8F1-46B0-900A-78CAEA29A71C}" type="datetimeFigureOut">
               <a:rPr lang="zh-CN" altLang="en-US" smtClean="0"/>
-              <a:t>2022/12/15</a:t>
+              <a:t>2022/12/20</a:t>
             </a:fld>
             <a:endParaRPr lang="zh-CN" altLang="en-US"/>
           </a:p>
@@ -2071,7 +2071,7 @@
           <a:p>
             <a:fld id="{8DE58D4B-F8F1-46B0-900A-78CAEA29A71C}" type="datetimeFigureOut">
               <a:rPr lang="zh-CN" altLang="en-US" smtClean="0"/>
-              <a:t>2022/12/15</a:t>
+              <a:t>2022/12/20</a:t>
             </a:fld>
             <a:endParaRPr lang="zh-CN" altLang="en-US"/>
           </a:p>
@@ -2382,7 +2382,7 @@
           <a:p>
             <a:fld id="{8DE58D4B-F8F1-46B0-900A-78CAEA29A71C}" type="datetimeFigureOut">
               <a:rPr lang="zh-CN" altLang="en-US" smtClean="0"/>
-              <a:t>2022/12/15</a:t>
+              <a:t>2022/12/20</a:t>
             </a:fld>
             <a:endParaRPr lang="zh-CN" altLang="en-US"/>
           </a:p>
@@ -2670,7 +2670,7 @@
           <a:p>
             <a:fld id="{8DE58D4B-F8F1-46B0-900A-78CAEA29A71C}" type="datetimeFigureOut">
               <a:rPr lang="zh-CN" altLang="en-US" smtClean="0"/>
-              <a:t>2022/12/15</a:t>
+              <a:t>2022/12/20</a:t>
             </a:fld>
             <a:endParaRPr lang="zh-CN" altLang="en-US"/>
           </a:p>
@@ -2911,7 +2911,7 @@
           <a:p>
             <a:fld id="{8DE58D4B-F8F1-46B0-900A-78CAEA29A71C}" type="datetimeFigureOut">
               <a:rPr lang="zh-CN" altLang="en-US" smtClean="0"/>
-              <a:t>2022/12/15</a:t>
+              <a:t>2022/12/20</a:t>
             </a:fld>
             <a:endParaRPr lang="zh-CN" altLang="en-US"/>
           </a:p>
@@ -3632,7 +3632,7 @@
         </p:blipFill>
         <p:spPr>
           <a:xfrm>
-            <a:off x="2319641" y="618349"/>
+            <a:off x="1908280" y="521400"/>
             <a:ext cx="914400" cy="914400"/>
           </a:xfrm>
           <a:prstGeom prst="rect">

</xml_diff>